<commit_message>
added cnty lat/long file for Alex
</commit_message>
<xml_diff>
--- a/presentation/NC Growth.pptx
+++ b/presentation/NC Growth.pptx
@@ -4098,8 +4098,21 @@
                   <a:schemeClr val="bg1"/>
                 </a:solidFill>
               </a:rPr>
-              <a:t>Quality of Life - Education</a:t>
-            </a:r>
+              <a:t>Quality of Life </a:t>
+            </a:r>
+            <a:r>
+              <a:rPr lang="en-US">
+                <a:solidFill>
+                  <a:schemeClr val="bg1"/>
+                </a:solidFill>
+              </a:rPr>
+              <a:t>- Crime</a:t>
+            </a:r>
+            <a:endParaRPr lang="en-US" dirty="0">
+              <a:solidFill>
+                <a:schemeClr val="bg1"/>
+              </a:solidFill>
+            </a:endParaRPr>
           </a:p>
         </p:txBody>
       </p:sp>

</xml_diff>

<commit_message>
added Hi Growth County Pub / Non Pub Enrollment
</commit_message>
<xml_diff>
--- a/presentation/NC Growth.pptx
+++ b/presentation/NC Growth.pptx
@@ -5,7 +5,7 @@
     <p:sldMasterId id="2147483792" r:id="rId1"/>
   </p:sldMasterIdLst>
   <p:notesMasterIdLst>
-    <p:notesMasterId r:id="rId13"/>
+    <p:notesMasterId r:id="rId14"/>
   </p:notesMasterIdLst>
   <p:sldIdLst>
     <p:sldId id="256" r:id="rId2"/>
@@ -18,7 +18,8 @@
     <p:sldId id="278" r:id="rId9"/>
     <p:sldId id="279" r:id="rId10"/>
     <p:sldId id="280" r:id="rId11"/>
-    <p:sldId id="264" r:id="rId12"/>
+    <p:sldId id="281" r:id="rId12"/>
+    <p:sldId id="264" r:id="rId13"/>
   </p:sldIdLst>
   <p:sldSz cx="12192000" cy="6858000"/>
   <p:notesSz cx="6858000" cy="9144000"/>
@@ -207,7 +208,7 @@
           <a:p>
             <a:fld id="{CECC4D60-9EE3-42B2-99BE-2D796BAC39BF}" type="datetimeFigureOut">
               <a:rPr lang="en-US" smtClean="0"/>
-              <a:t>1/10/2020</a:t>
+              <a:t>1/18/2020</a:t>
             </a:fld>
             <a:endParaRPr lang="en-US"/>
           </a:p>
@@ -816,7 +817,7 @@
           <a:p>
             <a:fld id="{7736F1F6-4F4C-493F-8DC4-612848D97E6E}" type="datetimeFigureOut">
               <a:rPr lang="en-CA" smtClean="0"/>
-              <a:t>2020-01-10</a:t>
+              <a:t>2020-01-18</a:t>
             </a:fld>
             <a:endParaRPr lang="en-CA"/>
           </a:p>
@@ -1044,7 +1045,7 @@
           <a:p>
             <a:fld id="{7736F1F6-4F4C-493F-8DC4-612848D97E6E}" type="datetimeFigureOut">
               <a:rPr lang="en-CA" smtClean="0"/>
-              <a:t>2020-01-10</a:t>
+              <a:t>2020-01-18</a:t>
             </a:fld>
             <a:endParaRPr lang="en-CA"/>
           </a:p>
@@ -1224,7 +1225,7 @@
           <a:p>
             <a:fld id="{7736F1F6-4F4C-493F-8DC4-612848D97E6E}" type="datetimeFigureOut">
               <a:rPr lang="en-CA" smtClean="0"/>
-              <a:t>2020-01-10</a:t>
+              <a:t>2020-01-18</a:t>
             </a:fld>
             <a:endParaRPr lang="en-CA"/>
           </a:p>
@@ -1394,7 +1395,7 @@
           <a:p>
             <a:fld id="{7736F1F6-4F4C-493F-8DC4-612848D97E6E}" type="datetimeFigureOut">
               <a:rPr lang="en-CA" smtClean="0"/>
-              <a:t>2020-01-10</a:t>
+              <a:t>2020-01-18</a:t>
             </a:fld>
             <a:endParaRPr lang="en-CA"/>
           </a:p>
@@ -1648,7 +1649,7 @@
           <a:p>
             <a:fld id="{7736F1F6-4F4C-493F-8DC4-612848D97E6E}" type="datetimeFigureOut">
               <a:rPr lang="en-CA" smtClean="0"/>
-              <a:t>2020-01-10</a:t>
+              <a:t>2020-01-18</a:t>
             </a:fld>
             <a:endParaRPr lang="en-CA"/>
           </a:p>
@@ -1974,7 +1975,7 @@
           <a:p>
             <a:fld id="{7736F1F6-4F4C-493F-8DC4-612848D97E6E}" type="datetimeFigureOut">
               <a:rPr lang="en-CA" smtClean="0"/>
-              <a:t>2020-01-10</a:t>
+              <a:t>2020-01-18</a:t>
             </a:fld>
             <a:endParaRPr lang="en-CA"/>
           </a:p>
@@ -2425,7 +2426,7 @@
           <a:p>
             <a:fld id="{7736F1F6-4F4C-493F-8DC4-612848D97E6E}" type="datetimeFigureOut">
               <a:rPr lang="en-CA" smtClean="0"/>
-              <a:t>2020-01-10</a:t>
+              <a:t>2020-01-18</a:t>
             </a:fld>
             <a:endParaRPr lang="en-CA"/>
           </a:p>
@@ -2543,7 +2544,7 @@
           <a:p>
             <a:fld id="{7736F1F6-4F4C-493F-8DC4-612848D97E6E}" type="datetimeFigureOut">
               <a:rPr lang="en-CA" smtClean="0"/>
-              <a:t>2020-01-10</a:t>
+              <a:t>2020-01-18</a:t>
             </a:fld>
             <a:endParaRPr lang="en-CA"/>
           </a:p>
@@ -2638,7 +2639,7 @@
           <a:p>
             <a:fld id="{7736F1F6-4F4C-493F-8DC4-612848D97E6E}" type="datetimeFigureOut">
               <a:rPr lang="en-CA" smtClean="0"/>
-              <a:t>2020-01-10</a:t>
+              <a:t>2020-01-18</a:t>
             </a:fld>
             <a:endParaRPr lang="en-CA"/>
           </a:p>
@@ -2925,7 +2926,7 @@
           <a:p>
             <a:fld id="{7736F1F6-4F4C-493F-8DC4-612848D97E6E}" type="datetimeFigureOut">
               <a:rPr lang="en-CA" smtClean="0"/>
-              <a:t>2020-01-10</a:t>
+              <a:t>2020-01-18</a:t>
             </a:fld>
             <a:endParaRPr lang="en-CA"/>
           </a:p>
@@ -3247,7 +3248,7 @@
           <a:p>
             <a:fld id="{7736F1F6-4F4C-493F-8DC4-612848D97E6E}" type="datetimeFigureOut">
               <a:rPr lang="en-CA" smtClean="0"/>
-              <a:t>2020-01-10</a:t>
+              <a:t>2020-01-18</a:t>
             </a:fld>
             <a:endParaRPr lang="en-CA"/>
           </a:p>
@@ -3501,7 +3502,7 @@
           <a:p>
             <a:fld id="{7736F1F6-4F4C-493F-8DC4-612848D97E6E}" type="datetimeFigureOut">
               <a:rPr lang="en-CA" smtClean="0"/>
-              <a:t>2020-01-10</a:t>
+              <a:t>2020-01-18</a:t>
             </a:fld>
             <a:endParaRPr lang="en-CA"/>
           </a:p>
@@ -4089,7 +4090,9 @@
           </a:solidFill>
         </p:spPr>
         <p:txBody>
-          <a:bodyPr/>
+          <a:bodyPr>
+            <a:normAutofit fontScale="90000"/>
+          </a:bodyPr>
           <a:lstStyle/>
           <a:p>
             <a:r>
@@ -4098,30 +4101,17 @@
                   <a:schemeClr val="bg1"/>
                 </a:solidFill>
               </a:rPr>
-              <a:t>Quality of Life </a:t>
-            </a:r>
-            <a:r>
-              <a:rPr lang="en-US">
-                <a:solidFill>
-                  <a:schemeClr val="bg1"/>
-                </a:solidFill>
-              </a:rPr>
-              <a:t>- Crime</a:t>
-            </a:r>
-            <a:endParaRPr lang="en-US" dirty="0">
-              <a:solidFill>
-                <a:schemeClr val="bg1"/>
-              </a:solidFill>
-            </a:endParaRPr>
+              <a:t>Public / Non Public School Enrollment</a:t>
+            </a:r>
           </a:p>
         </p:txBody>
       </p:sp>
       <p:pic>
         <p:nvPicPr>
-          <p:cNvPr id="5" name="Picture 4">
+          <p:cNvPr id="4" name="Picture 3">
             <a:extLst>
               <a:ext uri="{FF2B5EF4-FFF2-40B4-BE49-F238E27FC236}">
-                <a16:creationId xmlns:a16="http://schemas.microsoft.com/office/drawing/2014/main" id="{32C0B2F5-14C4-481C-B3EC-EB54E1966B80}"/>
+                <a16:creationId xmlns:a16="http://schemas.microsoft.com/office/drawing/2014/main" id="{FE97AC0D-90E5-49D6-854B-251DCA4E3581}"/>
               </a:ext>
             </a:extLst>
           </p:cNvPr>
@@ -4131,15 +4121,51 @@
           <p:nvPr/>
         </p:nvPicPr>
         <p:blipFill>
-          <a:blip r:embed="rId2"/>
+          <a:blip r:embed="rId2">
+            <a:extLst>
+              <a:ext uri="{28A0092B-C50C-407E-A947-70E740481C1C}">
+                <a14:useLocalDpi xmlns:a14="http://schemas.microsoft.com/office/drawing/2010/main" val="0"/>
+              </a:ext>
+            </a:extLst>
+          </a:blip>
           <a:stretch>
             <a:fillRect/>
           </a:stretch>
         </p:blipFill>
         <p:spPr>
           <a:xfrm>
-            <a:off x="5719431" y="6124922"/>
-            <a:ext cx="613109" cy="327695"/>
+            <a:off x="301657" y="1021552"/>
+            <a:ext cx="4477733" cy="3034092"/>
+          </a:xfrm>
+          <a:prstGeom prst="rect">
+            <a:avLst/>
+          </a:prstGeom>
+        </p:spPr>
+      </p:pic>
+      <p:pic>
+        <p:nvPicPr>
+          <p:cNvPr id="6" name="Picture 5">
+            <a:extLst>
+              <a:ext uri="{FF2B5EF4-FFF2-40B4-BE49-F238E27FC236}">
+                <a16:creationId xmlns:a16="http://schemas.microsoft.com/office/drawing/2014/main" id="{CB8C20ED-2B43-4DCD-B8C1-49A4FEC50DB5}"/>
+              </a:ext>
+            </a:extLst>
+          </p:cNvPr>
+          <p:cNvPicPr>
+            <a:picLocks noChangeAspect="1"/>
+          </p:cNvPicPr>
+          <p:nvPr/>
+        </p:nvPicPr>
+        <p:blipFill>
+          <a:blip r:embed="rId3"/>
+          <a:stretch>
+            <a:fillRect/>
+          </a:stretch>
+        </p:blipFill>
+        <p:spPr>
+          <a:xfrm>
+            <a:off x="301656" y="3860766"/>
+            <a:ext cx="4477733" cy="3049406"/>
           </a:xfrm>
           <a:prstGeom prst="rect">
             <a:avLst/>
@@ -4178,6 +4204,78 @@
       </p:grpSpPr>
       <p:sp>
         <p:nvSpPr>
+          <p:cNvPr id="2" name="Title 1">
+            <a:extLst>
+              <a:ext uri="{FF2B5EF4-FFF2-40B4-BE49-F238E27FC236}">
+                <a16:creationId xmlns:a16="http://schemas.microsoft.com/office/drawing/2014/main" id="{1FA5D142-60A1-48CF-BE17-0E3125420571}"/>
+              </a:ext>
+            </a:extLst>
+          </p:cNvPr>
+          <p:cNvSpPr>
+            <a:spLocks noGrp="1"/>
+          </p:cNvSpPr>
+          <p:nvPr>
+            <p:ph type="title"/>
+          </p:nvPr>
+        </p:nvSpPr>
+        <p:spPr>
+          <a:xfrm>
+            <a:off x="0" y="0"/>
+            <a:ext cx="9692640" cy="754144"/>
+          </a:xfrm>
+          <a:solidFill>
+            <a:schemeClr val="tx1"/>
+          </a:solidFill>
+        </p:spPr>
+        <p:txBody>
+          <a:bodyPr>
+            <a:normAutofit/>
+          </a:bodyPr>
+          <a:lstStyle/>
+          <a:p>
+            <a:r>
+              <a:rPr lang="en-US" dirty="0">
+                <a:solidFill>
+                  <a:schemeClr val="bg1"/>
+                </a:solidFill>
+              </a:rPr>
+              <a:t>Where Next?</a:t>
+            </a:r>
+          </a:p>
+        </p:txBody>
+      </p:sp>
+    </p:spTree>
+    <p:extLst>
+      <p:ext uri="{BB962C8B-B14F-4D97-AF65-F5344CB8AC3E}">
+        <p14:creationId xmlns:p14="http://schemas.microsoft.com/office/powerpoint/2010/main" val="344149926"/>
+      </p:ext>
+    </p:extLst>
+  </p:cSld>
+  <p:clrMapOvr>
+    <a:masterClrMapping/>
+  </p:clrMapOvr>
+</p:sld>
+</file>
+
+<file path=ppt/slides/slide12.xml><?xml version="1.0" encoding="utf-8"?>
+<p:sld xmlns:a="http://schemas.openxmlformats.org/drawingml/2006/main" xmlns:r="http://schemas.openxmlformats.org/officeDocument/2006/relationships" xmlns:p="http://schemas.openxmlformats.org/presentationml/2006/main">
+  <p:cSld>
+    <p:spTree>
+      <p:nvGrpSpPr>
+        <p:cNvPr id="1" name=""/>
+        <p:cNvGrpSpPr/>
+        <p:nvPr/>
+      </p:nvGrpSpPr>
+      <p:grpSpPr>
+        <a:xfrm>
+          <a:off x="0" y="0"/>
+          <a:ext cx="0" cy="0"/>
+          <a:chOff x="0" y="0"/>
+          <a:chExt cx="0" cy="0"/>
+        </a:xfrm>
+      </p:grpSpPr>
+      <p:sp>
+        <p:nvSpPr>
           <p:cNvPr id="4" name="Text Placeholder 3"/>
           <p:cNvSpPr>
             <a:spLocks noGrp="1"/>
@@ -4340,7 +4438,7 @@
         <p:spPr>
           <a:xfrm>
             <a:off x="207390" y="1005791"/>
-            <a:ext cx="9577633" cy="3970318"/>
+            <a:ext cx="9577633" cy="3693319"/>
           </a:xfrm>
           <a:prstGeom prst="rect">
             <a:avLst/>
@@ -4375,7 +4473,11 @@
             </a:pPr>
             <a:r>
               <a:rPr lang="en-CA" dirty="0"/>
-              <a:t>Given a net positive state inflow as well as national population growth, has growth in NC counties been generally uniform OR have some counties/areas experienced significantly more growth?</a:t>
+              <a:t>Given a net positive state inflow, has growth in NC counties been generally uniform OR have some counties/areas experienced significantly more growth? </a:t>
+            </a:r>
+            <a:r>
+              <a:rPr lang="en-CA" i="1" dirty="0"/>
+              <a:t>Test hypothesis that growth is limited to already densely populated areas.</a:t>
             </a:r>
           </a:p>
           <a:p>
@@ -4387,7 +4489,7 @@
           <a:p>
             <a:r>
               <a:rPr lang="en-CA" dirty="0"/>
-              <a:t>2. For counties identified where strong growth is identified through analysis, have those counties also demonstrated changes in some key metrics? To answer this question with balance we choose to analyze data through three lenses: Political , Economical &amp; Quality of Life.</a:t>
+              <a:t>2. For counties identified where strong inflow is identified through analysis, has the profile of these counties changed? To answer this question with balance we choose to analyze data through three lenses: Political , Economical &amp; School Enrollment.</a:t>
             </a:r>
           </a:p>
           <a:p>
@@ -5273,41 +5375,11 @@
           <a:p>
             <a:r>
               <a:rPr lang="en-US" dirty="0"/>
-              <a:t>Part 2– Change in  High Growth Counties</a:t>
-            </a:r>
-          </a:p>
-        </p:txBody>
-      </p:sp>
-      <p:pic>
-        <p:nvPicPr>
-          <p:cNvPr id="8" name="Picture 7">
-            <a:extLst>
-              <a:ext uri="{FF2B5EF4-FFF2-40B4-BE49-F238E27FC236}">
-                <a16:creationId xmlns:a16="http://schemas.microsoft.com/office/drawing/2014/main" id="{921330EC-23BB-42B3-83A0-829F01870DC9}"/>
-              </a:ext>
-            </a:extLst>
-          </p:cNvPr>
-          <p:cNvPicPr>
-            <a:picLocks noChangeAspect="1"/>
-          </p:cNvPicPr>
-          <p:nvPr/>
-        </p:nvPicPr>
-        <p:blipFill>
-          <a:blip r:embed="rId3"/>
-          <a:stretch>
-            <a:fillRect/>
-          </a:stretch>
-        </p:blipFill>
-        <p:spPr>
-          <a:xfrm>
-            <a:off x="7555989" y="1942012"/>
-            <a:ext cx="1690273" cy="1602466"/>
-          </a:xfrm>
-          <a:prstGeom prst="rect">
-            <a:avLst/>
-          </a:prstGeom>
-        </p:spPr>
-      </p:pic>
+              <a:t>Part 2– High Growth County Profile Trends</a:t>
+            </a:r>
+          </a:p>
+        </p:txBody>
+      </p:sp>
       <p:pic>
         <p:nvPicPr>
           <p:cNvPr id="9" name="Picture 8">
@@ -5323,7 +5395,7 @@
           <p:nvPr/>
         </p:nvPicPr>
         <p:blipFill>
-          <a:blip r:embed="rId4"/>
+          <a:blip r:embed="rId3"/>
           <a:stretch>
             <a:fillRect/>
           </a:stretch>
@@ -5353,7 +5425,7 @@
           <p:nvPr/>
         </p:nvPicPr>
         <p:blipFill>
-          <a:blip r:embed="rId5"/>
+          <a:blip r:embed="rId4"/>
           <a:stretch>
             <a:fillRect/>
           </a:stretch>
@@ -5486,11 +5558,41 @@
                 </a:solidFill>
                 <a:latin typeface="Arial Black" panose="020B0A04020102020204" pitchFamily="34" charset="0"/>
               </a:rPr>
-              <a:t>Quality of Life</a:t>
-            </a:r>
-          </a:p>
-        </p:txBody>
-      </p:sp>
+              <a:t>Education</a:t>
+            </a:r>
+          </a:p>
+        </p:txBody>
+      </p:sp>
+      <p:pic>
+        <p:nvPicPr>
+          <p:cNvPr id="3" name="Picture 2">
+            <a:extLst>
+              <a:ext uri="{FF2B5EF4-FFF2-40B4-BE49-F238E27FC236}">
+                <a16:creationId xmlns:a16="http://schemas.microsoft.com/office/drawing/2014/main" id="{66972B55-20CE-4F26-99D4-C7430EB4CB89}"/>
+              </a:ext>
+            </a:extLst>
+          </p:cNvPr>
+          <p:cNvPicPr>
+            <a:picLocks noChangeAspect="1"/>
+          </p:cNvPicPr>
+          <p:nvPr/>
+        </p:nvPicPr>
+        <p:blipFill>
+          <a:blip r:embed="rId5"/>
+          <a:stretch>
+            <a:fillRect/>
+          </a:stretch>
+        </p:blipFill>
+        <p:spPr>
+          <a:xfrm>
+            <a:off x="7772539" y="2273353"/>
+            <a:ext cx="1416398" cy="1271125"/>
+          </a:xfrm>
+          <a:prstGeom prst="rect">
+            <a:avLst/>
+          </a:prstGeom>
+        </p:spPr>
+      </p:pic>
     </p:spTree>
     <p:extLst>
       <p:ext uri="{BB962C8B-B14F-4D97-AF65-F5344CB8AC3E}">
@@ -5729,7 +5831,7 @@
           <a:p>
             <a:r>
               <a:rPr lang="en-CA" dirty="0"/>
-              <a:t>slides for Jasmine's economic stuff</a:t>
+              <a:t>slides for Jasmine’s median income stuff</a:t>
             </a:r>
           </a:p>
           <a:p>

</xml_diff>